<commit_message>
fix usecase and erd
</commit_message>
<xml_diff>
--- a/PP_WebJapanese.pptx
+++ b/PP_WebJapanese.pptx
@@ -360,7 +360,7 @@
           <a:p>
             <a:fld id="{A782C7B4-6875-4084-9C14-2C96A1631CD6}" type="datetimeFigureOut">
               <a:rPr lang="en-US" smtClean="0"/>
-              <a:t>12/11/2019</a:t>
+              <a:t>12/12/2019</a:t>
             </a:fld>
             <a:endParaRPr lang="en-US"/>
           </a:p>
@@ -12898,7 +12898,7 @@
       </p:sp>
       <p:pic>
         <p:nvPicPr>
-          <p:cNvPr id="3" name="Picture 2"/>
+          <p:cNvPr id="2" name="Picture 1"/>
           <p:cNvPicPr>
             <a:picLocks noChangeAspect="1"/>
           </p:cNvPicPr>
@@ -12912,8 +12912,8 @@
         </p:blipFill>
         <p:spPr>
           <a:xfrm>
-            <a:off x="1103086" y="974143"/>
-            <a:ext cx="6761246" cy="4169357"/>
+            <a:off x="1231543" y="1019083"/>
+            <a:ext cx="6680913" cy="4124417"/>
           </a:xfrm>
           <a:prstGeom prst="rect">
             <a:avLst/>
@@ -13018,34 +13018,6 @@
           </a:p>
         </p:txBody>
       </p:sp>
-      <p:pic>
-        <p:nvPicPr>
-          <p:cNvPr id="104" name="Google Shape;104;p20"/>
-          <p:cNvPicPr preferRelativeResize="0"/>
-          <p:nvPr/>
-        </p:nvPicPr>
-        <p:blipFill>
-          <a:blip r:embed="rId3">
-            <a:alphaModFix/>
-          </a:blip>
-          <a:stretch>
-            <a:fillRect/>
-          </a:stretch>
-        </p:blipFill>
-        <p:spPr>
-          <a:xfrm>
-            <a:off x="223625" y="985100"/>
-            <a:ext cx="8696749" cy="3956050"/>
-          </a:xfrm>
-          <a:prstGeom prst="rect">
-            <a:avLst/>
-          </a:prstGeom>
-          <a:noFill/>
-          <a:ln>
-            <a:noFill/>
-          </a:ln>
-        </p:spPr>
-      </p:pic>
       <p:sp>
         <p:nvSpPr>
           <p:cNvPr id="6" name="Slide Number Placeholder 5"/>
@@ -13078,6 +13050,30 @@
           </a:p>
         </p:txBody>
       </p:sp>
+      <p:pic>
+        <p:nvPicPr>
+          <p:cNvPr id="2" name="Picture 1"/>
+          <p:cNvPicPr>
+            <a:picLocks noChangeAspect="1"/>
+          </p:cNvPicPr>
+          <p:nvPr/>
+        </p:nvPicPr>
+        <p:blipFill>
+          <a:blip r:embed="rId3"/>
+          <a:stretch>
+            <a:fillRect/>
+          </a:stretch>
+        </p:blipFill>
+        <p:spPr>
+          <a:xfrm>
+            <a:off x="464948" y="1188891"/>
+            <a:ext cx="8367351" cy="3867926"/>
+          </a:xfrm>
+          <a:prstGeom prst="rect">
+            <a:avLst/>
+          </a:prstGeom>
+        </p:spPr>
+      </p:pic>
     </p:spTree>
   </p:cSld>
   <p:clrMapOvr>

</xml_diff>